<commit_message>
added plot of RSA among sites of purifying and diversifying selection
</commit_message>
<xml_diff>
--- a/paper/figures/omegabysite_structural_analysis/omegabysite_structural_analysis.pptx
+++ b/paper/figures/omegabysite_structural_analysis/omegabysite_structural_analysis.pptx
@@ -288,7 +288,7 @@
           <a:p>
             <a:fld id="{B1E60CEC-8CC6-8B48-9CD4-E19D93CC4CEE}" type="datetimeFigureOut">
               <a:rPr lang="en-US" smtClean="0"/>
-              <a:t>11/3/17</a:t>
+              <a:t>11/6/17</a:t>
             </a:fld>
             <a:endParaRPr lang="en-US"/>
           </a:p>
@@ -458,7 +458,7 @@
           <a:p>
             <a:fld id="{B1E60CEC-8CC6-8B48-9CD4-E19D93CC4CEE}" type="datetimeFigureOut">
               <a:rPr lang="en-US" smtClean="0"/>
-              <a:t>11/3/17</a:t>
+              <a:t>11/6/17</a:t>
             </a:fld>
             <a:endParaRPr lang="en-US"/>
           </a:p>
@@ -638,7 +638,7 @@
           <a:p>
             <a:fld id="{B1E60CEC-8CC6-8B48-9CD4-E19D93CC4CEE}" type="datetimeFigureOut">
               <a:rPr lang="en-US" smtClean="0"/>
-              <a:t>11/3/17</a:t>
+              <a:t>11/6/17</a:t>
             </a:fld>
             <a:endParaRPr lang="en-US"/>
           </a:p>
@@ -808,7 +808,7 @@
           <a:p>
             <a:fld id="{B1E60CEC-8CC6-8B48-9CD4-E19D93CC4CEE}" type="datetimeFigureOut">
               <a:rPr lang="en-US" smtClean="0"/>
-              <a:t>11/3/17</a:t>
+              <a:t>11/6/17</a:t>
             </a:fld>
             <a:endParaRPr lang="en-US"/>
           </a:p>
@@ -1054,7 +1054,7 @@
           <a:p>
             <a:fld id="{B1E60CEC-8CC6-8B48-9CD4-E19D93CC4CEE}" type="datetimeFigureOut">
               <a:rPr lang="en-US" smtClean="0"/>
-              <a:t>11/3/17</a:t>
+              <a:t>11/6/17</a:t>
             </a:fld>
             <a:endParaRPr lang="en-US"/>
           </a:p>
@@ -1342,7 +1342,7 @@
           <a:p>
             <a:fld id="{B1E60CEC-8CC6-8B48-9CD4-E19D93CC4CEE}" type="datetimeFigureOut">
               <a:rPr lang="en-US" smtClean="0"/>
-              <a:t>11/3/17</a:t>
+              <a:t>11/6/17</a:t>
             </a:fld>
             <a:endParaRPr lang="en-US"/>
           </a:p>
@@ -1769,7 +1769,7 @@
           <a:p>
             <a:fld id="{B1E60CEC-8CC6-8B48-9CD4-E19D93CC4CEE}" type="datetimeFigureOut">
               <a:rPr lang="en-US" smtClean="0"/>
-              <a:t>11/3/17</a:t>
+              <a:t>11/6/17</a:t>
             </a:fld>
             <a:endParaRPr lang="en-US"/>
           </a:p>
@@ -1887,7 +1887,7 @@
           <a:p>
             <a:fld id="{B1E60CEC-8CC6-8B48-9CD4-E19D93CC4CEE}" type="datetimeFigureOut">
               <a:rPr lang="en-US" smtClean="0"/>
-              <a:t>11/3/17</a:t>
+              <a:t>11/6/17</a:t>
             </a:fld>
             <a:endParaRPr lang="en-US"/>
           </a:p>
@@ -1982,7 +1982,7 @@
           <a:p>
             <a:fld id="{B1E60CEC-8CC6-8B48-9CD4-E19D93CC4CEE}" type="datetimeFigureOut">
               <a:rPr lang="en-US" smtClean="0"/>
-              <a:t>11/3/17</a:t>
+              <a:t>11/6/17</a:t>
             </a:fld>
             <a:endParaRPr lang="en-US"/>
           </a:p>
@@ -2259,7 +2259,7 @@
           <a:p>
             <a:fld id="{B1E60CEC-8CC6-8B48-9CD4-E19D93CC4CEE}" type="datetimeFigureOut">
               <a:rPr lang="en-US" smtClean="0"/>
-              <a:t>11/3/17</a:t>
+              <a:t>11/6/17</a:t>
             </a:fld>
             <a:endParaRPr lang="en-US"/>
           </a:p>
@@ -2512,7 +2512,7 @@
           <a:p>
             <a:fld id="{B1E60CEC-8CC6-8B48-9CD4-E19D93CC4CEE}" type="datetimeFigureOut">
               <a:rPr lang="en-US" smtClean="0"/>
-              <a:t>11/3/17</a:t>
+              <a:t>11/6/17</a:t>
             </a:fld>
             <a:endParaRPr lang="en-US"/>
           </a:p>
@@ -2725,7 +2725,7 @@
           <a:p>
             <a:fld id="{B1E60CEC-8CC6-8B48-9CD4-E19D93CC4CEE}" type="datetimeFigureOut">
               <a:rPr lang="en-US" smtClean="0"/>
-              <a:t>11/3/17</a:t>
+              <a:t>11/6/17</a:t>
             </a:fld>
             <a:endParaRPr lang="en-US"/>
           </a:p>
@@ -3329,13 +3329,13 @@
           <a:p>
             <a:pPr algn="ctr"/>
             <a:r>
-              <a:rPr lang="en-US" sz="1100" u="sng" dirty="0" smtClean="0">
+              <a:rPr lang="en-US" sz="1100" dirty="0" smtClean="0">
                 <a:latin typeface="Arial"/>
                 <a:cs typeface="Arial"/>
               </a:rPr>
               <a:t>BG505</a:t>
             </a:r>
-            <a:endParaRPr lang="en-US" sz="1100" u="sng" dirty="0">
+            <a:endParaRPr lang="en-US" sz="1100" dirty="0">
               <a:latin typeface="Arial"/>
               <a:cs typeface="Arial"/>
             </a:endParaRPr>
@@ -3475,13 +3475,13 @@
           <a:p>
             <a:pPr algn="ctr"/>
             <a:r>
-              <a:rPr lang="en-US" sz="1100" u="sng" dirty="0" smtClean="0">
+              <a:rPr lang="en-US" sz="1100" dirty="0" smtClean="0">
                 <a:latin typeface="Arial"/>
                 <a:cs typeface="Arial"/>
               </a:rPr>
               <a:t>BF520</a:t>
             </a:r>
-            <a:endParaRPr lang="en-US" sz="1100" u="sng" dirty="0">
+            <a:endParaRPr lang="en-US" sz="1100" dirty="0">
               <a:latin typeface="Arial"/>
               <a:cs typeface="Arial"/>
             </a:endParaRPr>
@@ -3577,10 +3577,6 @@
               </a:rPr>
               <a:t>B</a:t>
             </a:r>
-            <a:endParaRPr lang="en-US" sz="1600" b="1" dirty="0">
-              <a:latin typeface="Arial"/>
-              <a:cs typeface="Arial"/>
-            </a:endParaRPr>
           </a:p>
         </p:txBody>
       </p:sp>
@@ -3613,10 +3609,6 @@
               </a:rPr>
               <a:t>C</a:t>
             </a:r>
-            <a:endParaRPr lang="en-US" sz="1600" b="1" dirty="0">
-              <a:latin typeface="Arial"/>
-              <a:cs typeface="Arial"/>
-            </a:endParaRPr>
           </a:p>
         </p:txBody>
       </p:sp>
@@ -3665,7 +3657,7 @@
         <p:spPr>
           <a:xfrm>
             <a:off x="4214999" y="2287542"/>
-            <a:ext cx="1707320" cy="1446550"/>
+            <a:ext cx="1707320" cy="1277273"/>
           </a:xfrm>
           <a:prstGeom prst="rect">
             <a:avLst/>
@@ -3685,55 +3677,18 @@
           <a:p>
             <a:r>
               <a:rPr lang="en-US" sz="1100" b="1" dirty="0" smtClean="0">
+                <a:solidFill>
+                  <a:srgbClr val="FF0000"/>
+                </a:solidFill>
                 <a:latin typeface="Arial"/>
                 <a:cs typeface="Arial"/>
               </a:rPr>
-              <a:t>violin plot showing the distribution of RSA values for:</a:t>
-            </a:r>
-          </a:p>
-          <a:p>
-            <a:pPr marL="171450" indent="-171450">
-              <a:buFont typeface="Arial"/>
-              <a:buChar char="•"/>
-            </a:pPr>
-            <a:r>
-              <a:rPr lang="en-US" sz="1100" b="1" dirty="0" smtClean="0">
-                <a:latin typeface="Arial"/>
-                <a:cs typeface="Arial"/>
-              </a:rPr>
-              <a:t>All sites</a:t>
+              <a:t>Some sort of zoom-in showing that many blue sites fall in the Andrew Ward delineated area related to conformation. Hugh will make.</a:t>
             </a:r>
             <a:endParaRPr lang="en-US" sz="1100" b="1" dirty="0">
-              <a:latin typeface="Arial"/>
-              <a:cs typeface="Arial"/>
-            </a:endParaRPr>
-          </a:p>
-          <a:p>
-            <a:pPr marL="171450" indent="-171450">
-              <a:buFont typeface="Arial"/>
-              <a:buChar char="•"/>
-            </a:pPr>
-            <a:r>
-              <a:rPr lang="en-US" sz="1100" b="1" dirty="0" smtClean="0">
-                <a:latin typeface="Arial"/>
-                <a:cs typeface="Arial"/>
-              </a:rPr>
-              <a:t>Significant sites with omega&gt;1</a:t>
-            </a:r>
-          </a:p>
-          <a:p>
-            <a:pPr marL="171450" indent="-171450">
-              <a:buFont typeface="Arial"/>
-              <a:buChar char="•"/>
-            </a:pPr>
-            <a:r>
-              <a:rPr lang="en-US" sz="1100" b="1" dirty="0" smtClean="0">
-                <a:latin typeface="Arial"/>
-                <a:cs typeface="Arial"/>
-              </a:rPr>
-              <a:t>Significant sites with omega&lt;1</a:t>
-            </a:r>
-            <a:endParaRPr lang="en-US" sz="1100" b="1" dirty="0">
+              <a:solidFill>
+                <a:srgbClr val="FF0000"/>
+              </a:solidFill>
               <a:latin typeface="Arial"/>
               <a:cs typeface="Arial"/>
             </a:endParaRPr>

</xml_diff>

<commit_message>
Add analysis of our results compared to the sites identified by the Ward group to be involved in conformational dynamics
</commit_message>
<xml_diff>
--- a/paper/figures/omegabysite_structural_analysis/omegabysite_structural_analysis.pptx
+++ b/paper/figures/omegabysite_structural_analysis/omegabysite_structural_analysis.pptx
@@ -5,7 +5,7 @@
     <p:sldMasterId id="2147483648" r:id="rId1"/>
   </p:sldMasterIdLst>
   <p:sldIdLst>
-    <p:sldId id="260" r:id="rId2"/>
+    <p:sldId id="261" r:id="rId2"/>
   </p:sldIdLst>
   <p:sldSz cx="6218238" cy="4022725"/>
   <p:notesSz cx="6858000" cy="9144000"/>
@@ -288,7 +288,7 @@
           <a:p>
             <a:fld id="{B1E60CEC-8CC6-8B48-9CD4-E19D93CC4CEE}" type="datetimeFigureOut">
               <a:rPr lang="en-US" smtClean="0"/>
-              <a:t>11/3/17</a:t>
+              <a:t>11/6/17</a:t>
             </a:fld>
             <a:endParaRPr lang="en-US"/>
           </a:p>
@@ -458,7 +458,7 @@
           <a:p>
             <a:fld id="{B1E60CEC-8CC6-8B48-9CD4-E19D93CC4CEE}" type="datetimeFigureOut">
               <a:rPr lang="en-US" smtClean="0"/>
-              <a:t>11/3/17</a:t>
+              <a:t>11/6/17</a:t>
             </a:fld>
             <a:endParaRPr lang="en-US"/>
           </a:p>
@@ -638,7 +638,7 @@
           <a:p>
             <a:fld id="{B1E60CEC-8CC6-8B48-9CD4-E19D93CC4CEE}" type="datetimeFigureOut">
               <a:rPr lang="en-US" smtClean="0"/>
-              <a:t>11/3/17</a:t>
+              <a:t>11/6/17</a:t>
             </a:fld>
             <a:endParaRPr lang="en-US"/>
           </a:p>
@@ -808,7 +808,7 @@
           <a:p>
             <a:fld id="{B1E60CEC-8CC6-8B48-9CD4-E19D93CC4CEE}" type="datetimeFigureOut">
               <a:rPr lang="en-US" smtClean="0"/>
-              <a:t>11/3/17</a:t>
+              <a:t>11/6/17</a:t>
             </a:fld>
             <a:endParaRPr lang="en-US"/>
           </a:p>
@@ -1054,7 +1054,7 @@
           <a:p>
             <a:fld id="{B1E60CEC-8CC6-8B48-9CD4-E19D93CC4CEE}" type="datetimeFigureOut">
               <a:rPr lang="en-US" smtClean="0"/>
-              <a:t>11/3/17</a:t>
+              <a:t>11/6/17</a:t>
             </a:fld>
             <a:endParaRPr lang="en-US"/>
           </a:p>
@@ -1342,7 +1342,7 @@
           <a:p>
             <a:fld id="{B1E60CEC-8CC6-8B48-9CD4-E19D93CC4CEE}" type="datetimeFigureOut">
               <a:rPr lang="en-US" smtClean="0"/>
-              <a:t>11/3/17</a:t>
+              <a:t>11/6/17</a:t>
             </a:fld>
             <a:endParaRPr lang="en-US"/>
           </a:p>
@@ -1769,7 +1769,7 @@
           <a:p>
             <a:fld id="{B1E60CEC-8CC6-8B48-9CD4-E19D93CC4CEE}" type="datetimeFigureOut">
               <a:rPr lang="en-US" smtClean="0"/>
-              <a:t>11/3/17</a:t>
+              <a:t>11/6/17</a:t>
             </a:fld>
             <a:endParaRPr lang="en-US"/>
           </a:p>
@@ -1887,7 +1887,7 @@
           <a:p>
             <a:fld id="{B1E60CEC-8CC6-8B48-9CD4-E19D93CC4CEE}" type="datetimeFigureOut">
               <a:rPr lang="en-US" smtClean="0"/>
-              <a:t>11/3/17</a:t>
+              <a:t>11/6/17</a:t>
             </a:fld>
             <a:endParaRPr lang="en-US"/>
           </a:p>
@@ -1982,7 +1982,7 @@
           <a:p>
             <a:fld id="{B1E60CEC-8CC6-8B48-9CD4-E19D93CC4CEE}" type="datetimeFigureOut">
               <a:rPr lang="en-US" smtClean="0"/>
-              <a:t>11/3/17</a:t>
+              <a:t>11/6/17</a:t>
             </a:fld>
             <a:endParaRPr lang="en-US"/>
           </a:p>
@@ -2259,7 +2259,7 @@
           <a:p>
             <a:fld id="{B1E60CEC-8CC6-8B48-9CD4-E19D93CC4CEE}" type="datetimeFigureOut">
               <a:rPr lang="en-US" smtClean="0"/>
-              <a:t>11/3/17</a:t>
+              <a:t>11/6/17</a:t>
             </a:fld>
             <a:endParaRPr lang="en-US"/>
           </a:p>
@@ -2512,7 +2512,7 @@
           <a:p>
             <a:fld id="{B1E60CEC-8CC6-8B48-9CD4-E19D93CC4CEE}" type="datetimeFigureOut">
               <a:rPr lang="en-US" smtClean="0"/>
-              <a:t>11/3/17</a:t>
+              <a:t>11/6/17</a:t>
             </a:fld>
             <a:endParaRPr lang="en-US"/>
           </a:p>
@@ -2725,7 +2725,7 @@
           <a:p>
             <a:fld id="{B1E60CEC-8CC6-8B48-9CD4-E19D93CC4CEE}" type="datetimeFigureOut">
               <a:rPr lang="en-US" smtClean="0"/>
-              <a:t>11/3/17</a:t>
+              <a:t>11/6/17</a:t>
             </a:fld>
             <a:endParaRPr lang="en-US"/>
           </a:p>
@@ -3102,6 +3102,36 @@
       </p:grpSpPr>
       <p:pic>
         <p:nvPicPr>
+          <p:cNvPr id="71" name="Picture 70"/>
+          <p:cNvPicPr>
+            <a:picLocks noChangeAspect="1"/>
+          </p:cNvPicPr>
+          <p:nvPr/>
+        </p:nvPicPr>
+        <p:blipFill>
+          <a:blip r:embed="rId2"/>
+          <a:stretch>
+            <a:fillRect/>
+          </a:stretch>
+        </p:blipFill>
+        <p:spPr>
+          <a:xfrm>
+            <a:off x="4018007" y="2176649"/>
+            <a:ext cx="2065896" cy="1558313"/>
+          </a:xfrm>
+          <a:prstGeom prst="rect">
+            <a:avLst/>
+          </a:prstGeom>
+          <a:ln w="12700" cmpd="sng">
+            <a:solidFill>
+              <a:srgbClr val="BFBFBF"/>
+            </a:solidFill>
+            <a:prstDash val="dash"/>
+          </a:ln>
+        </p:spPr>
+      </p:pic>
+      <p:pic>
+        <p:nvPicPr>
           <p:cNvPr id="2" name="Picture 1"/>
           <p:cNvPicPr>
             <a:picLocks noChangeAspect="1"/>
@@ -3109,7 +3139,7 @@
           <p:nvPr/>
         </p:nvPicPr>
         <p:blipFill>
-          <a:blip r:embed="rId2"/>
+          <a:blip r:embed="rId3"/>
           <a:stretch>
             <a:fillRect/>
           </a:stretch>
@@ -3133,7 +3163,7 @@
           <p:nvPr/>
         </p:nvPicPr>
         <p:blipFill>
-          <a:blip r:embed="rId3"/>
+          <a:blip r:embed="rId4"/>
           <a:stretch>
             <a:fillRect/>
           </a:stretch>
@@ -3157,7 +3187,7 @@
           <p:nvPr/>
         </p:nvPicPr>
         <p:blipFill>
-          <a:blip r:embed="rId4"/>
+          <a:blip r:embed="rId5"/>
           <a:stretch>
             <a:fillRect/>
           </a:stretch>
@@ -3181,7 +3211,7 @@
           <p:nvPr/>
         </p:nvPicPr>
         <p:blipFill>
-          <a:blip r:embed="rId5"/>
+          <a:blip r:embed="rId6"/>
           <a:stretch>
             <a:fillRect/>
           </a:stretch>
@@ -3496,16 +3526,15 @@
           </p:cNvPicPr>
           <p:nvPr/>
         </p:nvPicPr>
-        <p:blipFill>
-          <a:blip r:embed="rId6"/>
-          <a:stretch>
-            <a:fillRect/>
-          </a:stretch>
+        <p:blipFill rotWithShape="1">
+          <a:blip r:embed="rId7"/>
+          <a:srcRect b="8712"/>
+          <a:stretch/>
         </p:blipFill>
         <p:spPr>
           <a:xfrm>
-            <a:off x="3842698" y="11967"/>
-            <a:ext cx="2286000" cy="2286000"/>
+            <a:off x="3819883" y="11967"/>
+            <a:ext cx="2286000" cy="2086846"/>
           </a:xfrm>
           <a:prstGeom prst="rect">
             <a:avLst/>
@@ -3577,10 +3606,6 @@
               </a:rPr>
               <a:t>B</a:t>
             </a:r>
-            <a:endParaRPr lang="en-US" sz="1600" b="1" dirty="0">
-              <a:latin typeface="Arial"/>
-              <a:cs typeface="Arial"/>
-            </a:endParaRPr>
           </a:p>
         </p:txBody>
       </p:sp>
@@ -3592,7 +3617,7 @@
         </p:nvSpPr>
         <p:spPr>
           <a:xfrm>
-            <a:off x="3737148" y="18658"/>
+            <a:off x="3709977" y="18658"/>
             <a:ext cx="332844" cy="338554"/>
           </a:xfrm>
           <a:prstGeom prst="rect">
@@ -3613,10 +3638,6 @@
               </a:rPr>
               <a:t>C</a:t>
             </a:r>
-            <a:endParaRPr lang="en-US" sz="1600" b="1" dirty="0">
-              <a:latin typeface="Arial"/>
-              <a:cs typeface="Arial"/>
-            </a:endParaRPr>
           </a:p>
         </p:txBody>
       </p:sp>
@@ -3628,7 +3649,7 @@
         </p:nvSpPr>
         <p:spPr>
           <a:xfrm>
-            <a:off x="3737148" y="1896483"/>
+            <a:off x="3709977" y="1896483"/>
             <a:ext cx="332844" cy="338554"/>
           </a:xfrm>
           <a:prstGeom prst="rect">
@@ -3656,26 +3677,325 @@
           </a:p>
         </p:txBody>
       </p:sp>
-      <p:sp>
-        <p:nvSpPr>
-          <p:cNvPr id="411" name="TextBox 410"/>
+      <p:grpSp>
+        <p:nvGrpSpPr>
+          <p:cNvPr id="14" name="Group 13"/>
+          <p:cNvGrpSpPr/>
+          <p:nvPr/>
+        </p:nvGrpSpPr>
+        <p:grpSpPr>
+          <a:xfrm>
+            <a:off x="5836313" y="3414959"/>
+            <a:ext cx="348587" cy="230832"/>
+            <a:chOff x="5918863" y="3416213"/>
+            <a:chExt cx="348587" cy="230832"/>
+          </a:xfrm>
+        </p:grpSpPr>
+        <p:sp>
+          <p:nvSpPr>
+            <p:cNvPr id="9" name="Rectangle 8"/>
+            <p:cNvSpPr/>
+            <p:nvPr/>
+          </p:nvSpPr>
+          <p:spPr>
+            <a:xfrm>
+              <a:off x="5976014" y="3438724"/>
+              <a:ext cx="193390" cy="193390"/>
+            </a:xfrm>
+            <a:prstGeom prst="rect">
+              <a:avLst/>
+            </a:prstGeom>
+            <a:solidFill>
+              <a:schemeClr val="bg1">
+                <a:lumMod val="50000"/>
+              </a:schemeClr>
+            </a:solidFill>
+            <a:ln>
+              <a:noFill/>
+            </a:ln>
+          </p:spPr>
+          <p:style>
+            <a:lnRef idx="2">
+              <a:schemeClr val="dk1"/>
+            </a:lnRef>
+            <a:fillRef idx="1">
+              <a:schemeClr val="lt1"/>
+            </a:fillRef>
+            <a:effectRef idx="0">
+              <a:schemeClr val="dk1"/>
+            </a:effectRef>
+            <a:fontRef idx="minor">
+              <a:schemeClr val="dk1"/>
+            </a:fontRef>
+          </p:style>
+          <p:txBody>
+            <a:bodyPr rtlCol="0" anchor="ctr"/>
+            <a:lstStyle/>
+            <a:p>
+              <a:pPr algn="ctr"/>
+              <a:endParaRPr lang="en-US" sz="900"/>
+            </a:p>
+          </p:txBody>
+        </p:sp>
+        <p:sp>
+          <p:nvSpPr>
+            <p:cNvPr id="8" name="TextBox 7"/>
+            <p:cNvSpPr txBox="1"/>
+            <p:nvPr/>
+          </p:nvSpPr>
+          <p:spPr>
+            <a:xfrm>
+              <a:off x="5918863" y="3416213"/>
+              <a:ext cx="348587" cy="230832"/>
+            </a:xfrm>
+            <a:prstGeom prst="rect">
+              <a:avLst/>
+            </a:prstGeom>
+            <a:noFill/>
+          </p:spPr>
+          <p:txBody>
+            <a:bodyPr wrap="square" rtlCol="0">
+              <a:spAutoFit/>
+            </a:bodyPr>
+            <a:lstStyle/>
+            <a:p>
+              <a:r>
+                <a:rPr lang="en-US" sz="900" b="1" dirty="0" smtClean="0">
+                  <a:solidFill>
+                    <a:srgbClr val="000000"/>
+                  </a:solidFill>
+                  <a:latin typeface="Arial"/>
+                  <a:cs typeface="Arial"/>
+                </a:rPr>
+                <a:t>72</a:t>
+              </a:r>
+              <a:endParaRPr lang="en-US" sz="900" b="1" dirty="0">
+                <a:solidFill>
+                  <a:srgbClr val="000000"/>
+                </a:solidFill>
+                <a:latin typeface="Arial"/>
+                <a:cs typeface="Arial"/>
+              </a:endParaRPr>
+            </a:p>
+          </p:txBody>
+        </p:sp>
+      </p:grpSp>
+      <p:grpSp>
+        <p:nvGrpSpPr>
+          <p:cNvPr id="10" name="Group 9"/>
+          <p:cNvGrpSpPr/>
+          <p:nvPr/>
+        </p:nvGrpSpPr>
+        <p:grpSpPr>
+          <a:xfrm>
+            <a:off x="5493338" y="3681702"/>
+            <a:ext cx="348587" cy="230832"/>
+            <a:chOff x="5436263" y="3699418"/>
+            <a:chExt cx="348587" cy="230832"/>
+          </a:xfrm>
+        </p:grpSpPr>
+        <p:sp>
+          <p:nvSpPr>
+            <p:cNvPr id="23" name="Rectangle 22"/>
+            <p:cNvSpPr/>
+            <p:nvPr/>
+          </p:nvSpPr>
+          <p:spPr>
+            <a:xfrm>
+              <a:off x="5493414" y="3721929"/>
+              <a:ext cx="193390" cy="193390"/>
+            </a:xfrm>
+            <a:prstGeom prst="rect">
+              <a:avLst/>
+            </a:prstGeom>
+            <a:solidFill>
+              <a:srgbClr val="3F5BDA"/>
+            </a:solidFill>
+            <a:ln>
+              <a:noFill/>
+            </a:ln>
+          </p:spPr>
+          <p:style>
+            <a:lnRef idx="2">
+              <a:schemeClr val="dk1"/>
+            </a:lnRef>
+            <a:fillRef idx="1">
+              <a:schemeClr val="lt1"/>
+            </a:fillRef>
+            <a:effectRef idx="0">
+              <a:schemeClr val="dk1"/>
+            </a:effectRef>
+            <a:fontRef idx="minor">
+              <a:schemeClr val="dk1"/>
+            </a:fontRef>
+          </p:style>
+          <p:txBody>
+            <a:bodyPr rtlCol="0" anchor="ctr"/>
+            <a:lstStyle/>
+            <a:p>
+              <a:pPr algn="ctr"/>
+              <a:endParaRPr lang="en-US" sz="900"/>
+            </a:p>
+          </p:txBody>
+        </p:sp>
+        <p:sp>
+          <p:nvSpPr>
+            <p:cNvPr id="24" name="TextBox 23"/>
+            <p:cNvSpPr txBox="1"/>
+            <p:nvPr/>
+          </p:nvSpPr>
+          <p:spPr>
+            <a:xfrm>
+              <a:off x="5436263" y="3699418"/>
+              <a:ext cx="348587" cy="230832"/>
+            </a:xfrm>
+            <a:prstGeom prst="rect">
+              <a:avLst/>
+            </a:prstGeom>
+            <a:noFill/>
+            <a:ln>
+              <a:noFill/>
+            </a:ln>
+          </p:spPr>
+          <p:txBody>
+            <a:bodyPr wrap="square" rtlCol="0">
+              <a:spAutoFit/>
+            </a:bodyPr>
+            <a:lstStyle/>
+            <a:p>
+              <a:r>
+                <a:rPr lang="en-US" sz="900" b="1" dirty="0" smtClean="0">
+                  <a:latin typeface="Arial"/>
+                  <a:cs typeface="Arial"/>
+                </a:rPr>
+                <a:t>73</a:t>
+              </a:r>
+              <a:endParaRPr lang="en-US" sz="900" b="1" dirty="0">
+                <a:latin typeface="Arial"/>
+                <a:cs typeface="Arial"/>
+              </a:endParaRPr>
+            </a:p>
+          </p:txBody>
+        </p:sp>
+      </p:grpSp>
+      <p:grpSp>
+        <p:nvGrpSpPr>
+          <p:cNvPr id="13" name="Group 12"/>
+          <p:cNvGrpSpPr/>
+          <p:nvPr/>
+        </p:nvGrpSpPr>
+        <p:grpSpPr>
+          <a:xfrm>
+            <a:off x="5069291" y="3461837"/>
+            <a:ext cx="348587" cy="230832"/>
+            <a:chOff x="5043891" y="3461837"/>
+            <a:chExt cx="348587" cy="230832"/>
+          </a:xfrm>
+        </p:grpSpPr>
+        <p:sp>
+          <p:nvSpPr>
+            <p:cNvPr id="25" name="Rectangle 24"/>
+            <p:cNvSpPr/>
+            <p:nvPr/>
+          </p:nvSpPr>
+          <p:spPr>
+            <a:xfrm>
+              <a:off x="5101042" y="3484348"/>
+              <a:ext cx="193390" cy="193390"/>
+            </a:xfrm>
+            <a:prstGeom prst="rect">
+              <a:avLst/>
+            </a:prstGeom>
+            <a:solidFill>
+              <a:schemeClr val="bg1">
+                <a:lumMod val="50000"/>
+              </a:schemeClr>
+            </a:solidFill>
+            <a:ln>
+              <a:noFill/>
+            </a:ln>
+          </p:spPr>
+          <p:style>
+            <a:lnRef idx="2">
+              <a:schemeClr val="dk1"/>
+            </a:lnRef>
+            <a:fillRef idx="1">
+              <a:schemeClr val="lt1"/>
+            </a:fillRef>
+            <a:effectRef idx="0">
+              <a:schemeClr val="dk1"/>
+            </a:effectRef>
+            <a:fontRef idx="minor">
+              <a:schemeClr val="dk1"/>
+            </a:fontRef>
+          </p:style>
+          <p:txBody>
+            <a:bodyPr rtlCol="0" anchor="ctr"/>
+            <a:lstStyle/>
+            <a:p>
+              <a:pPr algn="ctr"/>
+              <a:endParaRPr lang="en-US" sz="900"/>
+            </a:p>
+          </p:txBody>
+        </p:sp>
+        <p:sp>
+          <p:nvSpPr>
+            <p:cNvPr id="26" name="TextBox 25"/>
+            <p:cNvSpPr txBox="1"/>
+            <p:nvPr/>
+          </p:nvSpPr>
+          <p:spPr>
+            <a:xfrm>
+              <a:off x="5043891" y="3461837"/>
+              <a:ext cx="348587" cy="230832"/>
+            </a:xfrm>
+            <a:prstGeom prst="rect">
+              <a:avLst/>
+            </a:prstGeom>
+            <a:noFill/>
+          </p:spPr>
+          <p:txBody>
+            <a:bodyPr wrap="square" rtlCol="0">
+              <a:spAutoFit/>
+            </a:bodyPr>
+            <a:lstStyle/>
+            <a:p>
+              <a:r>
+                <a:rPr lang="en-US" sz="900" b="1" dirty="0" smtClean="0">
+                  <a:solidFill>
+                    <a:srgbClr val="000000"/>
+                  </a:solidFill>
+                  <a:latin typeface="Arial"/>
+                  <a:cs typeface="Arial"/>
+                </a:rPr>
+                <a:t>69</a:t>
+              </a:r>
+              <a:endParaRPr lang="en-US" sz="900" b="1" dirty="0">
+                <a:solidFill>
+                  <a:srgbClr val="000000"/>
+                </a:solidFill>
+                <a:latin typeface="Arial"/>
+                <a:cs typeface="Arial"/>
+              </a:endParaRPr>
+            </a:p>
+          </p:txBody>
+        </p:sp>
+      </p:grpSp>
+      <p:sp>
+        <p:nvSpPr>
+          <p:cNvPr id="27" name="TextBox 26"/>
           <p:cNvSpPr txBox="1"/>
           <p:nvPr/>
         </p:nvSpPr>
         <p:spPr>
           <a:xfrm>
-            <a:off x="4214999" y="2287542"/>
-            <a:ext cx="1707320" cy="1446550"/>
+            <a:off x="5532769" y="3050296"/>
+            <a:ext cx="348587" cy="230832"/>
           </a:xfrm>
           <a:prstGeom prst="rect">
             <a:avLst/>
           </a:prstGeom>
           <a:noFill/>
-          <a:ln>
-            <a:solidFill>
-              <a:schemeClr val="tx1"/>
-            </a:solidFill>
-          </a:ln>
         </p:spPr>
         <p:txBody>
           <a:bodyPr wrap="square" rtlCol="0">
@@ -3684,66 +4004,912 @@
           <a:lstStyle/>
           <a:p>
             <a:r>
-              <a:rPr lang="en-US" sz="1100" b="1" dirty="0" smtClean="0">
+              <a:rPr lang="en-US" sz="900" b="1" dirty="0" smtClean="0">
                 <a:latin typeface="Arial"/>
                 <a:cs typeface="Arial"/>
               </a:rPr>
-              <a:t>violin plot showing the distribution of RSA values for:</a:t>
-            </a:r>
-          </a:p>
-          <a:p>
-            <a:pPr marL="171450" indent="-171450">
-              <a:buFont typeface="Arial"/>
-              <a:buChar char="•"/>
-            </a:pPr>
-            <a:r>
-              <a:rPr lang="en-US" sz="1100" b="1" dirty="0" smtClean="0">
-                <a:latin typeface="Arial"/>
-                <a:cs typeface="Arial"/>
-              </a:rPr>
-              <a:t>All sites</a:t>
-            </a:r>
-            <a:endParaRPr lang="en-US" sz="1100" b="1" dirty="0">
+              <a:t>70</a:t>
+            </a:r>
+            <a:endParaRPr lang="en-US" sz="900" b="1" dirty="0">
               <a:latin typeface="Arial"/>
               <a:cs typeface="Arial"/>
             </a:endParaRPr>
           </a:p>
-          <a:p>
-            <a:pPr marL="171450" indent="-171450">
-              <a:buFont typeface="Arial"/>
-              <a:buChar char="•"/>
-            </a:pPr>
-            <a:r>
-              <a:rPr lang="en-US" sz="1100" b="1" dirty="0" smtClean="0">
+        </p:txBody>
+      </p:sp>
+      <p:grpSp>
+        <p:nvGrpSpPr>
+          <p:cNvPr id="11" name="Group 10"/>
+          <p:cNvGrpSpPr/>
+          <p:nvPr/>
+        </p:nvGrpSpPr>
+        <p:grpSpPr>
+          <a:xfrm>
+            <a:off x="4666803" y="3679070"/>
+            <a:ext cx="443174" cy="369332"/>
+            <a:chOff x="4670568" y="3690436"/>
+            <a:chExt cx="443174" cy="369332"/>
+          </a:xfrm>
+        </p:grpSpPr>
+        <p:sp>
+          <p:nvSpPr>
+            <p:cNvPr id="31" name="Rectangle 30"/>
+            <p:cNvSpPr/>
+            <p:nvPr/>
+          </p:nvSpPr>
+          <p:spPr>
+            <a:xfrm>
+              <a:off x="4730527" y="3712947"/>
+              <a:ext cx="245865" cy="193390"/>
+            </a:xfrm>
+            <a:prstGeom prst="rect">
+              <a:avLst/>
+            </a:prstGeom>
+            <a:solidFill>
+              <a:srgbClr val="3F5BDA"/>
+            </a:solidFill>
+            <a:ln>
+              <a:noFill/>
+            </a:ln>
+          </p:spPr>
+          <p:style>
+            <a:lnRef idx="2">
+              <a:schemeClr val="dk1"/>
+            </a:lnRef>
+            <a:fillRef idx="1">
+              <a:schemeClr val="lt1"/>
+            </a:fillRef>
+            <a:effectRef idx="0">
+              <a:schemeClr val="dk1"/>
+            </a:effectRef>
+            <a:fontRef idx="minor">
+              <a:schemeClr val="dk1"/>
+            </a:fontRef>
+          </p:style>
+          <p:txBody>
+            <a:bodyPr rtlCol="0" anchor="ctr"/>
+            <a:lstStyle/>
+            <a:p>
+              <a:pPr algn="ctr"/>
+              <a:endParaRPr lang="en-US" sz="900"/>
+            </a:p>
+          </p:txBody>
+        </p:sp>
+        <p:sp>
+          <p:nvSpPr>
+            <p:cNvPr id="32" name="TextBox 31"/>
+            <p:cNvSpPr txBox="1"/>
+            <p:nvPr/>
+          </p:nvSpPr>
+          <p:spPr>
+            <a:xfrm>
+              <a:off x="4670568" y="3690436"/>
+              <a:ext cx="443174" cy="369332"/>
+            </a:xfrm>
+            <a:prstGeom prst="rect">
+              <a:avLst/>
+            </a:prstGeom>
+            <a:noFill/>
+            <a:ln>
+              <a:noFill/>
+            </a:ln>
+          </p:spPr>
+          <p:txBody>
+            <a:bodyPr wrap="square" rtlCol="0">
+              <a:spAutoFit/>
+            </a:bodyPr>
+            <a:lstStyle/>
+            <a:p>
+              <a:r>
+                <a:rPr lang="en-US" sz="900" b="1" dirty="0" smtClean="0">
+                  <a:latin typeface="Arial"/>
+                  <a:cs typeface="Arial"/>
+                </a:rPr>
+                <a:t>110</a:t>
+              </a:r>
+              <a:endParaRPr lang="en-US" sz="900" b="1" dirty="0">
                 <a:latin typeface="Arial"/>
                 <a:cs typeface="Arial"/>
-              </a:rPr>
-              <a:t>Significant sites with omega&gt;1</a:t>
-            </a:r>
-          </a:p>
-          <a:p>
-            <a:pPr marL="171450" indent="-171450">
-              <a:buFont typeface="Arial"/>
-              <a:buChar char="•"/>
-            </a:pPr>
-            <a:r>
-              <a:rPr lang="en-US" sz="1100" b="1" dirty="0" smtClean="0">
+              </a:endParaRPr>
+            </a:p>
+          </p:txBody>
+        </p:sp>
+      </p:grpSp>
+      <p:grpSp>
+        <p:nvGrpSpPr>
+          <p:cNvPr id="34" name="Group 33"/>
+          <p:cNvGrpSpPr/>
+          <p:nvPr/>
+        </p:nvGrpSpPr>
+        <p:grpSpPr>
+          <a:xfrm>
+            <a:off x="4152517" y="3512416"/>
+            <a:ext cx="443174" cy="230832"/>
+            <a:chOff x="4670568" y="3690436"/>
+            <a:chExt cx="443174" cy="230832"/>
+          </a:xfrm>
+        </p:grpSpPr>
+        <p:sp>
+          <p:nvSpPr>
+            <p:cNvPr id="35" name="Rectangle 34"/>
+            <p:cNvSpPr/>
+            <p:nvPr/>
+          </p:nvSpPr>
+          <p:spPr>
+            <a:xfrm>
+              <a:off x="4730527" y="3712947"/>
+              <a:ext cx="245865" cy="193390"/>
+            </a:xfrm>
+            <a:prstGeom prst="rect">
+              <a:avLst/>
+            </a:prstGeom>
+            <a:solidFill>
+              <a:srgbClr val="3F5BDA"/>
+            </a:solidFill>
+            <a:ln>
+              <a:noFill/>
+            </a:ln>
+          </p:spPr>
+          <p:style>
+            <a:lnRef idx="2">
+              <a:schemeClr val="dk1"/>
+            </a:lnRef>
+            <a:fillRef idx="1">
+              <a:schemeClr val="lt1"/>
+            </a:fillRef>
+            <a:effectRef idx="0">
+              <a:schemeClr val="dk1"/>
+            </a:effectRef>
+            <a:fontRef idx="minor">
+              <a:schemeClr val="dk1"/>
+            </a:fontRef>
+          </p:style>
+          <p:txBody>
+            <a:bodyPr rtlCol="0" anchor="ctr"/>
+            <a:lstStyle/>
+            <a:p>
+              <a:pPr algn="ctr"/>
+              <a:endParaRPr lang="en-US" sz="900"/>
+            </a:p>
+          </p:txBody>
+        </p:sp>
+        <p:sp>
+          <p:nvSpPr>
+            <p:cNvPr id="36" name="TextBox 35"/>
+            <p:cNvSpPr txBox="1"/>
+            <p:nvPr/>
+          </p:nvSpPr>
+          <p:spPr>
+            <a:xfrm>
+              <a:off x="4670568" y="3690436"/>
+              <a:ext cx="443174" cy="230832"/>
+            </a:xfrm>
+            <a:prstGeom prst="rect">
+              <a:avLst/>
+            </a:prstGeom>
+            <a:noFill/>
+            <a:ln>
+              <a:noFill/>
+            </a:ln>
+          </p:spPr>
+          <p:txBody>
+            <a:bodyPr wrap="square" rtlCol="0">
+              <a:spAutoFit/>
+            </a:bodyPr>
+            <a:lstStyle/>
+            <a:p>
+              <a:r>
+                <a:rPr lang="en-US" sz="900" b="1" dirty="0" smtClean="0">
+                  <a:latin typeface="Arial"/>
+                  <a:cs typeface="Arial"/>
+                </a:rPr>
+                <a:t>113</a:t>
+              </a:r>
+              <a:endParaRPr lang="en-US" sz="900" b="1" dirty="0">
                 <a:latin typeface="Arial"/>
                 <a:cs typeface="Arial"/>
-              </a:rPr>
-              <a:t>Significant sites with omega&lt;1</a:t>
-            </a:r>
-            <a:endParaRPr lang="en-US" sz="1100" b="1" dirty="0">
-              <a:latin typeface="Arial"/>
-              <a:cs typeface="Arial"/>
-            </a:endParaRPr>
-          </a:p>
-        </p:txBody>
-      </p:sp>
+              </a:endParaRPr>
+            </a:p>
+          </p:txBody>
+        </p:sp>
+      </p:grpSp>
+      <p:grpSp>
+        <p:nvGrpSpPr>
+          <p:cNvPr id="12" name="Group 11"/>
+          <p:cNvGrpSpPr/>
+          <p:nvPr/>
+        </p:nvGrpSpPr>
+        <p:grpSpPr>
+          <a:xfrm>
+            <a:off x="3940703" y="3264724"/>
+            <a:ext cx="443174" cy="230832"/>
+            <a:chOff x="3877203" y="3245674"/>
+            <a:chExt cx="443174" cy="230832"/>
+          </a:xfrm>
+        </p:grpSpPr>
+        <p:sp>
+          <p:nvSpPr>
+            <p:cNvPr id="41" name="Rectangle 40"/>
+            <p:cNvSpPr/>
+            <p:nvPr/>
+          </p:nvSpPr>
+          <p:spPr>
+            <a:xfrm>
+              <a:off x="3937162" y="3268185"/>
+              <a:ext cx="245865" cy="193390"/>
+            </a:xfrm>
+            <a:prstGeom prst="rect">
+              <a:avLst/>
+            </a:prstGeom>
+            <a:solidFill>
+              <a:srgbClr val="7F7F7F"/>
+            </a:solidFill>
+            <a:ln>
+              <a:noFill/>
+            </a:ln>
+          </p:spPr>
+          <p:style>
+            <a:lnRef idx="2">
+              <a:schemeClr val="dk1"/>
+            </a:lnRef>
+            <a:fillRef idx="1">
+              <a:schemeClr val="lt1"/>
+            </a:fillRef>
+            <a:effectRef idx="0">
+              <a:schemeClr val="dk1"/>
+            </a:effectRef>
+            <a:fontRef idx="minor">
+              <a:schemeClr val="dk1"/>
+            </a:fontRef>
+          </p:style>
+          <p:txBody>
+            <a:bodyPr rtlCol="0" anchor="ctr"/>
+            <a:lstStyle/>
+            <a:p>
+              <a:pPr algn="ctr"/>
+              <a:endParaRPr lang="en-US" sz="900"/>
+            </a:p>
+          </p:txBody>
+        </p:sp>
+        <p:sp>
+          <p:nvSpPr>
+            <p:cNvPr id="42" name="TextBox 41"/>
+            <p:cNvSpPr txBox="1"/>
+            <p:nvPr/>
+          </p:nvSpPr>
+          <p:spPr>
+            <a:xfrm>
+              <a:off x="3877203" y="3245674"/>
+              <a:ext cx="443174" cy="230832"/>
+            </a:xfrm>
+            <a:prstGeom prst="rect">
+              <a:avLst/>
+            </a:prstGeom>
+            <a:noFill/>
+            <a:ln>
+              <a:noFill/>
+            </a:ln>
+          </p:spPr>
+          <p:txBody>
+            <a:bodyPr wrap="square" rtlCol="0">
+              <a:spAutoFit/>
+            </a:bodyPr>
+            <a:lstStyle/>
+            <a:p>
+              <a:r>
+                <a:rPr lang="en-US" sz="900" b="1" dirty="0" smtClean="0">
+                  <a:latin typeface="Arial"/>
+                  <a:cs typeface="Arial"/>
+                </a:rPr>
+                <a:t>427</a:t>
+              </a:r>
+              <a:endParaRPr lang="en-US" sz="900" b="1" dirty="0">
+                <a:latin typeface="Arial"/>
+                <a:cs typeface="Arial"/>
+              </a:endParaRPr>
+            </a:p>
+          </p:txBody>
+        </p:sp>
+      </p:grpSp>
+      <p:grpSp>
+        <p:nvGrpSpPr>
+          <p:cNvPr id="44" name="Group 43"/>
+          <p:cNvGrpSpPr/>
+          <p:nvPr/>
+        </p:nvGrpSpPr>
+        <p:grpSpPr>
+          <a:xfrm>
+            <a:off x="4058383" y="2702359"/>
+            <a:ext cx="443174" cy="230832"/>
+            <a:chOff x="3877203" y="3245674"/>
+            <a:chExt cx="443174" cy="230832"/>
+          </a:xfrm>
+        </p:grpSpPr>
+        <p:sp>
+          <p:nvSpPr>
+            <p:cNvPr id="45" name="Rectangle 44"/>
+            <p:cNvSpPr/>
+            <p:nvPr/>
+          </p:nvSpPr>
+          <p:spPr>
+            <a:xfrm>
+              <a:off x="3937162" y="3268185"/>
+              <a:ext cx="245865" cy="193390"/>
+            </a:xfrm>
+            <a:prstGeom prst="rect">
+              <a:avLst/>
+            </a:prstGeom>
+            <a:solidFill>
+              <a:srgbClr val="7F7F7F"/>
+            </a:solidFill>
+            <a:ln>
+              <a:noFill/>
+            </a:ln>
+          </p:spPr>
+          <p:style>
+            <a:lnRef idx="2">
+              <a:schemeClr val="dk1"/>
+            </a:lnRef>
+            <a:fillRef idx="1">
+              <a:schemeClr val="lt1"/>
+            </a:fillRef>
+            <a:effectRef idx="0">
+              <a:schemeClr val="dk1"/>
+            </a:effectRef>
+            <a:fontRef idx="minor">
+              <a:schemeClr val="dk1"/>
+            </a:fontRef>
+          </p:style>
+          <p:txBody>
+            <a:bodyPr rtlCol="0" anchor="ctr"/>
+            <a:lstStyle/>
+            <a:p>
+              <a:pPr algn="ctr"/>
+              <a:endParaRPr lang="en-US" sz="900"/>
+            </a:p>
+          </p:txBody>
+        </p:sp>
+        <p:sp>
+          <p:nvSpPr>
+            <p:cNvPr id="46" name="TextBox 45"/>
+            <p:cNvSpPr txBox="1"/>
+            <p:nvPr/>
+          </p:nvSpPr>
+          <p:spPr>
+            <a:xfrm>
+              <a:off x="3877203" y="3245674"/>
+              <a:ext cx="443174" cy="230832"/>
+            </a:xfrm>
+            <a:prstGeom prst="rect">
+              <a:avLst/>
+            </a:prstGeom>
+            <a:noFill/>
+            <a:ln>
+              <a:noFill/>
+            </a:ln>
+          </p:spPr>
+          <p:txBody>
+            <a:bodyPr wrap="square" rtlCol="0">
+              <a:spAutoFit/>
+            </a:bodyPr>
+            <a:lstStyle/>
+            <a:p>
+              <a:r>
+                <a:rPr lang="en-US" sz="900" b="1" dirty="0" smtClean="0">
+                  <a:latin typeface="Arial"/>
+                  <a:cs typeface="Arial"/>
+                </a:rPr>
+                <a:t>112</a:t>
+              </a:r>
+              <a:endParaRPr lang="en-US" sz="900" b="1" dirty="0">
+                <a:latin typeface="Arial"/>
+                <a:cs typeface="Arial"/>
+              </a:endParaRPr>
+            </a:p>
+          </p:txBody>
+        </p:sp>
+      </p:grpSp>
+      <p:grpSp>
+        <p:nvGrpSpPr>
+          <p:cNvPr id="47" name="Group 46"/>
+          <p:cNvGrpSpPr/>
+          <p:nvPr/>
+        </p:nvGrpSpPr>
+        <p:grpSpPr>
+          <a:xfrm>
+            <a:off x="4920729" y="3128136"/>
+            <a:ext cx="443174" cy="230832"/>
+            <a:chOff x="3877203" y="3245674"/>
+            <a:chExt cx="443174" cy="230832"/>
+          </a:xfrm>
+        </p:grpSpPr>
+        <p:sp>
+          <p:nvSpPr>
+            <p:cNvPr id="48" name="Rectangle 47"/>
+            <p:cNvSpPr/>
+            <p:nvPr/>
+          </p:nvSpPr>
+          <p:spPr>
+            <a:xfrm>
+              <a:off x="3937162" y="3268185"/>
+              <a:ext cx="245865" cy="193390"/>
+            </a:xfrm>
+            <a:prstGeom prst="rect">
+              <a:avLst/>
+            </a:prstGeom>
+            <a:solidFill>
+              <a:srgbClr val="7F7F7F"/>
+            </a:solidFill>
+            <a:ln>
+              <a:noFill/>
+            </a:ln>
+          </p:spPr>
+          <p:style>
+            <a:lnRef idx="2">
+              <a:schemeClr val="dk1"/>
+            </a:lnRef>
+            <a:fillRef idx="1">
+              <a:schemeClr val="lt1"/>
+            </a:fillRef>
+            <a:effectRef idx="0">
+              <a:schemeClr val="dk1"/>
+            </a:effectRef>
+            <a:fontRef idx="minor">
+              <a:schemeClr val="dk1"/>
+            </a:fontRef>
+          </p:style>
+          <p:txBody>
+            <a:bodyPr rtlCol="0" anchor="ctr"/>
+            <a:lstStyle/>
+            <a:p>
+              <a:pPr algn="ctr"/>
+              <a:endParaRPr lang="en-US" sz="900"/>
+            </a:p>
+          </p:txBody>
+        </p:sp>
+        <p:sp>
+          <p:nvSpPr>
+            <p:cNvPr id="49" name="TextBox 48"/>
+            <p:cNvSpPr txBox="1"/>
+            <p:nvPr/>
+          </p:nvSpPr>
+          <p:spPr>
+            <a:xfrm>
+              <a:off x="3877203" y="3245674"/>
+              <a:ext cx="443174" cy="230832"/>
+            </a:xfrm>
+            <a:prstGeom prst="rect">
+              <a:avLst/>
+            </a:prstGeom>
+            <a:noFill/>
+            <a:ln>
+              <a:noFill/>
+            </a:ln>
+          </p:spPr>
+          <p:txBody>
+            <a:bodyPr wrap="square" rtlCol="0">
+              <a:spAutoFit/>
+            </a:bodyPr>
+            <a:lstStyle/>
+            <a:p>
+              <a:r>
+                <a:rPr lang="en-US" sz="900" b="1" dirty="0" smtClean="0">
+                  <a:latin typeface="Arial"/>
+                  <a:cs typeface="Arial"/>
+                </a:rPr>
+                <a:t>111</a:t>
+              </a:r>
+              <a:endParaRPr lang="en-US" sz="900" b="1" dirty="0">
+                <a:latin typeface="Arial"/>
+                <a:cs typeface="Arial"/>
+              </a:endParaRPr>
+            </a:p>
+          </p:txBody>
+        </p:sp>
+      </p:grpSp>
+      <p:grpSp>
+        <p:nvGrpSpPr>
+          <p:cNvPr id="51" name="Group 50"/>
+          <p:cNvGrpSpPr/>
+          <p:nvPr/>
+        </p:nvGrpSpPr>
+        <p:grpSpPr>
+          <a:xfrm>
+            <a:off x="4098790" y="2297377"/>
+            <a:ext cx="443174" cy="230832"/>
+            <a:chOff x="3877203" y="3245674"/>
+            <a:chExt cx="443174" cy="230832"/>
+          </a:xfrm>
+        </p:grpSpPr>
+        <p:sp>
+          <p:nvSpPr>
+            <p:cNvPr id="52" name="Rectangle 51"/>
+            <p:cNvSpPr/>
+            <p:nvPr/>
+          </p:nvSpPr>
+          <p:spPr>
+            <a:xfrm>
+              <a:off x="3937162" y="3268185"/>
+              <a:ext cx="245865" cy="193390"/>
+            </a:xfrm>
+            <a:prstGeom prst="rect">
+              <a:avLst/>
+            </a:prstGeom>
+            <a:solidFill>
+              <a:srgbClr val="7F7F7F"/>
+            </a:solidFill>
+            <a:ln>
+              <a:noFill/>
+            </a:ln>
+          </p:spPr>
+          <p:style>
+            <a:lnRef idx="2">
+              <a:schemeClr val="dk1"/>
+            </a:lnRef>
+            <a:fillRef idx="1">
+              <a:schemeClr val="lt1"/>
+            </a:fillRef>
+            <a:effectRef idx="0">
+              <a:schemeClr val="dk1"/>
+            </a:effectRef>
+            <a:fontRef idx="minor">
+              <a:schemeClr val="dk1"/>
+            </a:fontRef>
+          </p:style>
+          <p:txBody>
+            <a:bodyPr rtlCol="0" anchor="ctr"/>
+            <a:lstStyle/>
+            <a:p>
+              <a:pPr algn="ctr"/>
+              <a:endParaRPr lang="en-US" sz="900"/>
+            </a:p>
+          </p:txBody>
+        </p:sp>
+        <p:sp>
+          <p:nvSpPr>
+            <p:cNvPr id="53" name="TextBox 52"/>
+            <p:cNvSpPr txBox="1"/>
+            <p:nvPr/>
+          </p:nvSpPr>
+          <p:spPr>
+            <a:xfrm>
+              <a:off x="3877203" y="3245674"/>
+              <a:ext cx="443174" cy="230832"/>
+            </a:xfrm>
+            <a:prstGeom prst="rect">
+              <a:avLst/>
+            </a:prstGeom>
+            <a:noFill/>
+            <a:ln>
+              <a:noFill/>
+            </a:ln>
+          </p:spPr>
+          <p:txBody>
+            <a:bodyPr wrap="square" rtlCol="0">
+              <a:spAutoFit/>
+            </a:bodyPr>
+            <a:lstStyle/>
+            <a:p>
+              <a:r>
+                <a:rPr lang="en-US" sz="900" b="1" dirty="0" smtClean="0">
+                  <a:latin typeface="Arial"/>
+                  <a:cs typeface="Arial"/>
+                </a:rPr>
+                <a:t>435</a:t>
+              </a:r>
+              <a:endParaRPr lang="en-US" sz="900" b="1" dirty="0">
+                <a:latin typeface="Arial"/>
+                <a:cs typeface="Arial"/>
+              </a:endParaRPr>
+            </a:p>
+          </p:txBody>
+        </p:sp>
+      </p:grpSp>
+      <p:grpSp>
+        <p:nvGrpSpPr>
+          <p:cNvPr id="58" name="Group 57"/>
+          <p:cNvGrpSpPr/>
+          <p:nvPr/>
+        </p:nvGrpSpPr>
+        <p:grpSpPr>
+          <a:xfrm>
+            <a:off x="5086817" y="2846740"/>
+            <a:ext cx="348587" cy="230832"/>
+            <a:chOff x="5436263" y="3699418"/>
+            <a:chExt cx="348587" cy="230832"/>
+          </a:xfrm>
+        </p:grpSpPr>
+        <p:sp>
+          <p:nvSpPr>
+            <p:cNvPr id="59" name="Rectangle 58"/>
+            <p:cNvSpPr/>
+            <p:nvPr/>
+          </p:nvSpPr>
+          <p:spPr>
+            <a:xfrm>
+              <a:off x="5493414" y="3721929"/>
+              <a:ext cx="193390" cy="193390"/>
+            </a:xfrm>
+            <a:prstGeom prst="rect">
+              <a:avLst/>
+            </a:prstGeom>
+            <a:solidFill>
+              <a:srgbClr val="3F5BDA"/>
+            </a:solidFill>
+            <a:ln>
+              <a:noFill/>
+            </a:ln>
+          </p:spPr>
+          <p:style>
+            <a:lnRef idx="2">
+              <a:schemeClr val="dk1"/>
+            </a:lnRef>
+            <a:fillRef idx="1">
+              <a:schemeClr val="lt1"/>
+            </a:fillRef>
+            <a:effectRef idx="0">
+              <a:schemeClr val="dk1"/>
+            </a:effectRef>
+            <a:fontRef idx="minor">
+              <a:schemeClr val="dk1"/>
+            </a:fontRef>
+          </p:style>
+          <p:txBody>
+            <a:bodyPr rtlCol="0" anchor="ctr"/>
+            <a:lstStyle/>
+            <a:p>
+              <a:pPr algn="ctr"/>
+              <a:endParaRPr lang="en-US" sz="900"/>
+            </a:p>
+          </p:txBody>
+        </p:sp>
+        <p:sp>
+          <p:nvSpPr>
+            <p:cNvPr id="60" name="TextBox 59"/>
+            <p:cNvSpPr txBox="1"/>
+            <p:nvPr/>
+          </p:nvSpPr>
+          <p:spPr>
+            <a:xfrm>
+              <a:off x="5436263" y="3699418"/>
+              <a:ext cx="348587" cy="230832"/>
+            </a:xfrm>
+            <a:prstGeom prst="rect">
+              <a:avLst/>
+            </a:prstGeom>
+            <a:noFill/>
+            <a:ln>
+              <a:noFill/>
+            </a:ln>
+          </p:spPr>
+          <p:txBody>
+            <a:bodyPr wrap="square" rtlCol="0">
+              <a:spAutoFit/>
+            </a:bodyPr>
+            <a:lstStyle/>
+            <a:p>
+              <a:r>
+                <a:rPr lang="en-US" sz="900" b="1" dirty="0" smtClean="0">
+                  <a:latin typeface="Arial"/>
+                  <a:cs typeface="Arial"/>
+                </a:rPr>
+                <a:t>66</a:t>
+              </a:r>
+              <a:endParaRPr lang="en-US" sz="900" b="1" dirty="0">
+                <a:latin typeface="Arial"/>
+                <a:cs typeface="Arial"/>
+              </a:endParaRPr>
+            </a:p>
+          </p:txBody>
+        </p:sp>
+      </p:grpSp>
+      <p:grpSp>
+        <p:nvGrpSpPr>
+          <p:cNvPr id="61" name="Group 60"/>
+          <p:cNvGrpSpPr/>
+          <p:nvPr/>
+        </p:nvGrpSpPr>
+        <p:grpSpPr>
+          <a:xfrm>
+            <a:off x="5562404" y="2300838"/>
+            <a:ext cx="348587" cy="230832"/>
+            <a:chOff x="5436263" y="3699418"/>
+            <a:chExt cx="348587" cy="230832"/>
+          </a:xfrm>
+        </p:grpSpPr>
+        <p:sp>
+          <p:nvSpPr>
+            <p:cNvPr id="62" name="Rectangle 61"/>
+            <p:cNvSpPr/>
+            <p:nvPr/>
+          </p:nvSpPr>
+          <p:spPr>
+            <a:xfrm>
+              <a:off x="5493414" y="3721929"/>
+              <a:ext cx="193390" cy="193390"/>
+            </a:xfrm>
+            <a:prstGeom prst="rect">
+              <a:avLst/>
+            </a:prstGeom>
+            <a:solidFill>
+              <a:srgbClr val="3F5BDA"/>
+            </a:solidFill>
+            <a:ln>
+              <a:noFill/>
+            </a:ln>
+          </p:spPr>
+          <p:style>
+            <a:lnRef idx="2">
+              <a:schemeClr val="dk1"/>
+            </a:lnRef>
+            <a:fillRef idx="1">
+              <a:schemeClr val="lt1"/>
+            </a:fillRef>
+            <a:effectRef idx="0">
+              <a:schemeClr val="dk1"/>
+            </a:effectRef>
+            <a:fontRef idx="minor">
+              <a:schemeClr val="dk1"/>
+            </a:fontRef>
+          </p:style>
+          <p:txBody>
+            <a:bodyPr rtlCol="0" anchor="ctr"/>
+            <a:lstStyle/>
+            <a:p>
+              <a:pPr algn="ctr"/>
+              <a:endParaRPr lang="en-US" sz="900"/>
+            </a:p>
+          </p:txBody>
+        </p:sp>
+        <p:sp>
+          <p:nvSpPr>
+            <p:cNvPr id="63" name="TextBox 62"/>
+            <p:cNvSpPr txBox="1"/>
+            <p:nvPr/>
+          </p:nvSpPr>
+          <p:spPr>
+            <a:xfrm>
+              <a:off x="5436263" y="3699418"/>
+              <a:ext cx="348587" cy="230832"/>
+            </a:xfrm>
+            <a:prstGeom prst="rect">
+              <a:avLst/>
+            </a:prstGeom>
+            <a:noFill/>
+            <a:ln>
+              <a:noFill/>
+            </a:ln>
+          </p:spPr>
+          <p:txBody>
+            <a:bodyPr wrap="square" rtlCol="0">
+              <a:spAutoFit/>
+            </a:bodyPr>
+            <a:lstStyle/>
+            <a:p>
+              <a:r>
+                <a:rPr lang="en-US" sz="900" b="1" dirty="0" smtClean="0">
+                  <a:latin typeface="Arial"/>
+                  <a:cs typeface="Arial"/>
+                </a:rPr>
+                <a:t>64</a:t>
+              </a:r>
+              <a:endParaRPr lang="en-US" sz="900" b="1" dirty="0">
+                <a:latin typeface="Arial"/>
+                <a:cs typeface="Arial"/>
+              </a:endParaRPr>
+            </a:p>
+          </p:txBody>
+        </p:sp>
+      </p:grpSp>
+      <p:grpSp>
+        <p:nvGrpSpPr>
+          <p:cNvPr id="67" name="Group 66"/>
+          <p:cNvGrpSpPr/>
+          <p:nvPr/>
+        </p:nvGrpSpPr>
+        <p:grpSpPr>
+          <a:xfrm>
+            <a:off x="5955938" y="2855819"/>
+            <a:ext cx="348587" cy="230832"/>
+            <a:chOff x="5436263" y="3699418"/>
+            <a:chExt cx="348587" cy="230832"/>
+          </a:xfrm>
+        </p:grpSpPr>
+        <p:sp>
+          <p:nvSpPr>
+            <p:cNvPr id="68" name="Rectangle 67"/>
+            <p:cNvSpPr/>
+            <p:nvPr/>
+          </p:nvSpPr>
+          <p:spPr>
+            <a:xfrm>
+              <a:off x="5493414" y="3721929"/>
+              <a:ext cx="193390" cy="193390"/>
+            </a:xfrm>
+            <a:prstGeom prst="rect">
+              <a:avLst/>
+            </a:prstGeom>
+            <a:solidFill>
+              <a:srgbClr val="3F5BDA"/>
+            </a:solidFill>
+            <a:ln>
+              <a:noFill/>
+            </a:ln>
+          </p:spPr>
+          <p:style>
+            <a:lnRef idx="2">
+              <a:schemeClr val="dk1"/>
+            </a:lnRef>
+            <a:fillRef idx="1">
+              <a:schemeClr val="lt1"/>
+            </a:fillRef>
+            <a:effectRef idx="0">
+              <a:schemeClr val="dk1"/>
+            </a:effectRef>
+            <a:fontRef idx="minor">
+              <a:schemeClr val="dk1"/>
+            </a:fontRef>
+          </p:style>
+          <p:txBody>
+            <a:bodyPr rtlCol="0" anchor="ctr"/>
+            <a:lstStyle/>
+            <a:p>
+              <a:pPr algn="ctr"/>
+              <a:endParaRPr lang="en-US" sz="900"/>
+            </a:p>
+          </p:txBody>
+        </p:sp>
+        <p:sp>
+          <p:nvSpPr>
+            <p:cNvPr id="69" name="TextBox 68"/>
+            <p:cNvSpPr txBox="1"/>
+            <p:nvPr/>
+          </p:nvSpPr>
+          <p:spPr>
+            <a:xfrm>
+              <a:off x="5436263" y="3699418"/>
+              <a:ext cx="348587" cy="230832"/>
+            </a:xfrm>
+            <a:prstGeom prst="rect">
+              <a:avLst/>
+            </a:prstGeom>
+            <a:noFill/>
+            <a:ln>
+              <a:noFill/>
+            </a:ln>
+          </p:spPr>
+          <p:txBody>
+            <a:bodyPr wrap="square" rtlCol="0">
+              <a:spAutoFit/>
+            </a:bodyPr>
+            <a:lstStyle/>
+            <a:p>
+              <a:r>
+                <a:rPr lang="en-US" sz="900" b="1" dirty="0">
+                  <a:latin typeface="Arial"/>
+                  <a:cs typeface="Arial"/>
+                </a:rPr>
+                <a:t>5</a:t>
+              </a:r>
+              <a:r>
+                <a:rPr lang="en-US" sz="900" b="1" dirty="0" smtClean="0">
+                  <a:latin typeface="Arial"/>
+                  <a:cs typeface="Arial"/>
+                </a:rPr>
+                <a:t>8</a:t>
+              </a:r>
+              <a:endParaRPr lang="en-US" sz="900" b="1" dirty="0">
+                <a:latin typeface="Arial"/>
+                <a:cs typeface="Arial"/>
+              </a:endParaRPr>
+            </a:p>
+          </p:txBody>
+        </p:sp>
+      </p:grpSp>
     </p:spTree>
     <p:extLst>
       <p:ext uri="{BB962C8B-B14F-4D97-AF65-F5344CB8AC3E}">
-        <p14:creationId xmlns:p14="http://schemas.microsoft.com/office/powerpoint/2010/main" val="1715545372"/>
+        <p14:creationId xmlns:p14="http://schemas.microsoft.com/office/powerpoint/2010/main" val="2997357567"/>
       </p:ext>
     </p:extLst>
   </p:cSld>

</xml_diff>

<commit_message>
resized panel C in `omegabysite_structural_analysis` figure
</commit_message>
<xml_diff>
--- a/paper/figures/omegabysite_structural_analysis/omegabysite_structural_analysis.pptx
+++ b/paper/figures/omegabysite_structural_analysis/omegabysite_structural_analysis.pptx
@@ -288,7 +288,7 @@
           <a:p>
             <a:fld id="{B1E60CEC-8CC6-8B48-9CD4-E19D93CC4CEE}" type="datetimeFigureOut">
               <a:rPr lang="en-US" smtClean="0"/>
-              <a:t>11/6/17</a:t>
+              <a:t>11/7/17</a:t>
             </a:fld>
             <a:endParaRPr lang="en-US"/>
           </a:p>
@@ -458,7 +458,7 @@
           <a:p>
             <a:fld id="{B1E60CEC-8CC6-8B48-9CD4-E19D93CC4CEE}" type="datetimeFigureOut">
               <a:rPr lang="en-US" smtClean="0"/>
-              <a:t>11/6/17</a:t>
+              <a:t>11/7/17</a:t>
             </a:fld>
             <a:endParaRPr lang="en-US"/>
           </a:p>
@@ -638,7 +638,7 @@
           <a:p>
             <a:fld id="{B1E60CEC-8CC6-8B48-9CD4-E19D93CC4CEE}" type="datetimeFigureOut">
               <a:rPr lang="en-US" smtClean="0"/>
-              <a:t>11/6/17</a:t>
+              <a:t>11/7/17</a:t>
             </a:fld>
             <a:endParaRPr lang="en-US"/>
           </a:p>
@@ -808,7 +808,7 @@
           <a:p>
             <a:fld id="{B1E60CEC-8CC6-8B48-9CD4-E19D93CC4CEE}" type="datetimeFigureOut">
               <a:rPr lang="en-US" smtClean="0"/>
-              <a:t>11/6/17</a:t>
+              <a:t>11/7/17</a:t>
             </a:fld>
             <a:endParaRPr lang="en-US"/>
           </a:p>
@@ -1054,7 +1054,7 @@
           <a:p>
             <a:fld id="{B1E60CEC-8CC6-8B48-9CD4-E19D93CC4CEE}" type="datetimeFigureOut">
               <a:rPr lang="en-US" smtClean="0"/>
-              <a:t>11/6/17</a:t>
+              <a:t>11/7/17</a:t>
             </a:fld>
             <a:endParaRPr lang="en-US"/>
           </a:p>
@@ -1342,7 +1342,7 @@
           <a:p>
             <a:fld id="{B1E60CEC-8CC6-8B48-9CD4-E19D93CC4CEE}" type="datetimeFigureOut">
               <a:rPr lang="en-US" smtClean="0"/>
-              <a:t>11/6/17</a:t>
+              <a:t>11/7/17</a:t>
             </a:fld>
             <a:endParaRPr lang="en-US"/>
           </a:p>
@@ -1769,7 +1769,7 @@
           <a:p>
             <a:fld id="{B1E60CEC-8CC6-8B48-9CD4-E19D93CC4CEE}" type="datetimeFigureOut">
               <a:rPr lang="en-US" smtClean="0"/>
-              <a:t>11/6/17</a:t>
+              <a:t>11/7/17</a:t>
             </a:fld>
             <a:endParaRPr lang="en-US"/>
           </a:p>
@@ -1887,7 +1887,7 @@
           <a:p>
             <a:fld id="{B1E60CEC-8CC6-8B48-9CD4-E19D93CC4CEE}" type="datetimeFigureOut">
               <a:rPr lang="en-US" smtClean="0"/>
-              <a:t>11/6/17</a:t>
+              <a:t>11/7/17</a:t>
             </a:fld>
             <a:endParaRPr lang="en-US"/>
           </a:p>
@@ -1982,7 +1982,7 @@
           <a:p>
             <a:fld id="{B1E60CEC-8CC6-8B48-9CD4-E19D93CC4CEE}" type="datetimeFigureOut">
               <a:rPr lang="en-US" smtClean="0"/>
-              <a:t>11/6/17</a:t>
+              <a:t>11/7/17</a:t>
             </a:fld>
             <a:endParaRPr lang="en-US"/>
           </a:p>
@@ -2259,7 +2259,7 @@
           <a:p>
             <a:fld id="{B1E60CEC-8CC6-8B48-9CD4-E19D93CC4CEE}" type="datetimeFigureOut">
               <a:rPr lang="en-US" smtClean="0"/>
-              <a:t>11/6/17</a:t>
+              <a:t>11/7/17</a:t>
             </a:fld>
             <a:endParaRPr lang="en-US"/>
           </a:p>
@@ -2512,7 +2512,7 @@
           <a:p>
             <a:fld id="{B1E60CEC-8CC6-8B48-9CD4-E19D93CC4CEE}" type="datetimeFigureOut">
               <a:rPr lang="en-US" smtClean="0"/>
-              <a:t>11/6/17</a:t>
+              <a:t>11/7/17</a:t>
             </a:fld>
             <a:endParaRPr lang="en-US"/>
           </a:p>
@@ -2725,7 +2725,7 @@
           <a:p>
             <a:fld id="{B1E60CEC-8CC6-8B48-9CD4-E19D93CC4CEE}" type="datetimeFigureOut">
               <a:rPr lang="en-US" smtClean="0"/>
-              <a:t>11/6/17</a:t>
+              <a:t>11/7/17</a:t>
             </a:fld>
             <a:endParaRPr lang="en-US"/>
           </a:p>
@@ -3528,13 +3528,13 @@
         </p:nvPicPr>
         <p:blipFill rotWithShape="1">
           <a:blip r:embed="rId7"/>
-          <a:srcRect b="8712"/>
+          <a:srcRect l="4065" t="8691" r="4507" b="8384"/>
           <a:stretch/>
         </p:blipFill>
         <p:spPr>
           <a:xfrm>
-            <a:off x="3819883" y="11967"/>
-            <a:ext cx="2286000" cy="2086846"/>
+            <a:off x="3929646" y="98347"/>
+            <a:ext cx="1965960" cy="1783080"/>
           </a:xfrm>
           <a:prstGeom prst="rect">
             <a:avLst/>

</xml_diff>

<commit_message>
color by N-glycan status in selection-by-site plots
</commit_message>
<xml_diff>
--- a/paper/figures/omegabysite_structural_analysis/omegabysite_structural_analysis.pptx
+++ b/paper/figures/omegabysite_structural_analysis/omegabysite_structural_analysis.pptx
@@ -3518,29 +3518,6 @@
           </a:p>
         </p:txBody>
       </p:sp>
-      <p:pic>
-        <p:nvPicPr>
-          <p:cNvPr id="6" name="Picture 5"/>
-          <p:cNvPicPr>
-            <a:picLocks noChangeAspect="1"/>
-          </p:cNvPicPr>
-          <p:nvPr/>
-        </p:nvPicPr>
-        <p:blipFill rotWithShape="1">
-          <a:blip r:embed="rId7"/>
-          <a:srcRect l="4065" t="8691" r="4507" b="8384"/>
-          <a:stretch/>
-        </p:blipFill>
-        <p:spPr>
-          <a:xfrm>
-            <a:off x="3929646" y="98347"/>
-            <a:ext cx="1965960" cy="1783080"/>
-          </a:xfrm>
-          <a:prstGeom prst="rect">
-            <a:avLst/>
-          </a:prstGeom>
-        </p:spPr>
-      </p:pic>
       <p:sp>
         <p:nvSpPr>
           <p:cNvPr id="2055" name="TextBox 2054"/>
@@ -3549,7 +3526,7 @@
         </p:nvSpPr>
         <p:spPr>
           <a:xfrm>
-            <a:off x="8004" y="-21865"/>
+            <a:off x="890" y="-68723"/>
             <a:ext cx="325730" cy="338554"/>
           </a:xfrm>
           <a:prstGeom prst="rect">
@@ -3585,7 +3562,7 @@
         </p:nvSpPr>
         <p:spPr>
           <a:xfrm>
-            <a:off x="890" y="1894921"/>
+            <a:off x="-6224" y="1868038"/>
             <a:ext cx="332844" cy="338554"/>
           </a:xfrm>
           <a:prstGeom prst="rect">
@@ -3617,7 +3594,7 @@
         </p:nvSpPr>
         <p:spPr>
           <a:xfrm>
-            <a:off x="3709977" y="18658"/>
+            <a:off x="3698673" y="-68723"/>
             <a:ext cx="332844" cy="338554"/>
           </a:xfrm>
           <a:prstGeom prst="rect">
@@ -3649,7 +3626,7 @@
         </p:nvSpPr>
         <p:spPr>
           <a:xfrm>
-            <a:off x="3709977" y="1896483"/>
+            <a:off x="3709977" y="1868038"/>
             <a:ext cx="332844" cy="338554"/>
           </a:xfrm>
           <a:prstGeom prst="rect">
@@ -4906,6 +4883,35 @@
           </p:txBody>
         </p:sp>
       </p:grpSp>
+      <p:pic>
+        <p:nvPicPr>
+          <p:cNvPr id="7" name="Picture 6" descr="diversifying_selection_corr.pdf"/>
+          <p:cNvPicPr>
+            <a:picLocks noChangeAspect="1"/>
+          </p:cNvPicPr>
+          <p:nvPr/>
+        </p:nvPicPr>
+        <p:blipFill rotWithShape="1">
+          <a:blip r:embed="rId7">
+            <a:extLst>
+              <a:ext uri="{28A0092B-C50C-407E-A947-70E740481C1C}">
+                <a14:useLocalDpi xmlns:a14="http://schemas.microsoft.com/office/drawing/2010/main" val="0"/>
+              </a:ext>
+            </a:extLst>
+          </a:blip>
+          <a:srcRect l="5369" t="12667" r="164" b="987"/>
+          <a:stretch/>
+        </p:blipFill>
+        <p:spPr>
+          <a:xfrm>
+            <a:off x="4013541" y="9144"/>
+            <a:ext cx="2131512" cy="1948288"/>
+          </a:xfrm>
+          <a:prstGeom prst="rect">
+            <a:avLst/>
+          </a:prstGeom>
+        </p:spPr>
+      </p:pic>
     </p:spTree>
     <p:extLst>
       <p:ext uri="{BB962C8B-B14F-4D97-AF65-F5344CB8AC3E}">

</xml_diff>

<commit_message>
start work on prefs dist
</commit_message>
<xml_diff>
--- a/paper/figures/omegabysite_structural_analysis/omegabysite_structural_analysis.pptx
+++ b/paper/figures/omegabysite_structural_analysis/omegabysite_structural_analysis.pptx
@@ -288,7 +288,7 @@
           <a:p>
             <a:fld id="{B1E60CEC-8CC6-8B48-9CD4-E19D93CC4CEE}" type="datetimeFigureOut">
               <a:rPr lang="en-US" smtClean="0"/>
-              <a:t>11/7/17</a:t>
+              <a:t>11/11/17</a:t>
             </a:fld>
             <a:endParaRPr lang="en-US"/>
           </a:p>
@@ -458,7 +458,7 @@
           <a:p>
             <a:fld id="{B1E60CEC-8CC6-8B48-9CD4-E19D93CC4CEE}" type="datetimeFigureOut">
               <a:rPr lang="en-US" smtClean="0"/>
-              <a:t>11/7/17</a:t>
+              <a:t>11/11/17</a:t>
             </a:fld>
             <a:endParaRPr lang="en-US"/>
           </a:p>
@@ -638,7 +638,7 @@
           <a:p>
             <a:fld id="{B1E60CEC-8CC6-8B48-9CD4-E19D93CC4CEE}" type="datetimeFigureOut">
               <a:rPr lang="en-US" smtClean="0"/>
-              <a:t>11/7/17</a:t>
+              <a:t>11/11/17</a:t>
             </a:fld>
             <a:endParaRPr lang="en-US"/>
           </a:p>
@@ -808,7 +808,7 @@
           <a:p>
             <a:fld id="{B1E60CEC-8CC6-8B48-9CD4-E19D93CC4CEE}" type="datetimeFigureOut">
               <a:rPr lang="en-US" smtClean="0"/>
-              <a:t>11/7/17</a:t>
+              <a:t>11/11/17</a:t>
             </a:fld>
             <a:endParaRPr lang="en-US"/>
           </a:p>
@@ -1054,7 +1054,7 @@
           <a:p>
             <a:fld id="{B1E60CEC-8CC6-8B48-9CD4-E19D93CC4CEE}" type="datetimeFigureOut">
               <a:rPr lang="en-US" smtClean="0"/>
-              <a:t>11/7/17</a:t>
+              <a:t>11/11/17</a:t>
             </a:fld>
             <a:endParaRPr lang="en-US"/>
           </a:p>
@@ -1342,7 +1342,7 @@
           <a:p>
             <a:fld id="{B1E60CEC-8CC6-8B48-9CD4-E19D93CC4CEE}" type="datetimeFigureOut">
               <a:rPr lang="en-US" smtClean="0"/>
-              <a:t>11/7/17</a:t>
+              <a:t>11/11/17</a:t>
             </a:fld>
             <a:endParaRPr lang="en-US"/>
           </a:p>
@@ -1769,7 +1769,7 @@
           <a:p>
             <a:fld id="{B1E60CEC-8CC6-8B48-9CD4-E19D93CC4CEE}" type="datetimeFigureOut">
               <a:rPr lang="en-US" smtClean="0"/>
-              <a:t>11/7/17</a:t>
+              <a:t>11/11/17</a:t>
             </a:fld>
             <a:endParaRPr lang="en-US"/>
           </a:p>
@@ -1887,7 +1887,7 @@
           <a:p>
             <a:fld id="{B1E60CEC-8CC6-8B48-9CD4-E19D93CC4CEE}" type="datetimeFigureOut">
               <a:rPr lang="en-US" smtClean="0"/>
-              <a:t>11/7/17</a:t>
+              <a:t>11/11/17</a:t>
             </a:fld>
             <a:endParaRPr lang="en-US"/>
           </a:p>
@@ -1982,7 +1982,7 @@
           <a:p>
             <a:fld id="{B1E60CEC-8CC6-8B48-9CD4-E19D93CC4CEE}" type="datetimeFigureOut">
               <a:rPr lang="en-US" smtClean="0"/>
-              <a:t>11/7/17</a:t>
+              <a:t>11/11/17</a:t>
             </a:fld>
             <a:endParaRPr lang="en-US"/>
           </a:p>
@@ -2259,7 +2259,7 @@
           <a:p>
             <a:fld id="{B1E60CEC-8CC6-8B48-9CD4-E19D93CC4CEE}" type="datetimeFigureOut">
               <a:rPr lang="en-US" smtClean="0"/>
-              <a:t>11/7/17</a:t>
+              <a:t>11/11/17</a:t>
             </a:fld>
             <a:endParaRPr lang="en-US"/>
           </a:p>
@@ -2512,7 +2512,7 @@
           <a:p>
             <a:fld id="{B1E60CEC-8CC6-8B48-9CD4-E19D93CC4CEE}" type="datetimeFigureOut">
               <a:rPr lang="en-US" smtClean="0"/>
-              <a:t>11/7/17</a:t>
+              <a:t>11/11/17</a:t>
             </a:fld>
             <a:endParaRPr lang="en-US"/>
           </a:p>
@@ -2725,7 +2725,7 @@
           <a:p>
             <a:fld id="{B1E60CEC-8CC6-8B48-9CD4-E19D93CC4CEE}" type="datetimeFigureOut">
               <a:rPr lang="en-US" smtClean="0"/>
-              <a:t>11/7/17</a:t>
+              <a:t>11/11/17</a:t>
             </a:fld>
             <a:endParaRPr lang="en-US"/>
           </a:p>
@@ -3102,6 +3102,35 @@
       </p:grpSpPr>
       <p:pic>
         <p:nvPicPr>
+          <p:cNvPr id="6" name="Picture 5" descr="diversifying_selection_corr.pdf"/>
+          <p:cNvPicPr>
+            <a:picLocks noChangeAspect="1"/>
+          </p:cNvPicPr>
+          <p:nvPr/>
+        </p:nvPicPr>
+        <p:blipFill rotWithShape="1">
+          <a:blip r:embed="rId2">
+            <a:extLst>
+              <a:ext uri="{28A0092B-C50C-407E-A947-70E740481C1C}">
+                <a14:useLocalDpi xmlns:a14="http://schemas.microsoft.com/office/drawing/2010/main" val="0"/>
+              </a:ext>
+            </a:extLst>
+          </a:blip>
+          <a:srcRect l="5398" t="11369" r="5549" b="4992"/>
+          <a:stretch/>
+        </p:blipFill>
+        <p:spPr>
+          <a:xfrm>
+            <a:off x="3977503" y="0"/>
+            <a:ext cx="2106400" cy="1978352"/>
+          </a:xfrm>
+          <a:prstGeom prst="rect">
+            <a:avLst/>
+          </a:prstGeom>
+        </p:spPr>
+      </p:pic>
+      <p:pic>
+        <p:nvPicPr>
           <p:cNvPr id="71" name="Picture 70"/>
           <p:cNvPicPr>
             <a:picLocks noChangeAspect="1"/>
@@ -3109,7 +3138,7 @@
           <p:nvPr/>
         </p:nvPicPr>
         <p:blipFill>
-          <a:blip r:embed="rId2"/>
+          <a:blip r:embed="rId3"/>
           <a:stretch>
             <a:fillRect/>
           </a:stretch>
@@ -3139,7 +3168,7 @@
           <p:nvPr/>
         </p:nvPicPr>
         <p:blipFill>
-          <a:blip r:embed="rId3"/>
+          <a:blip r:embed="rId4"/>
           <a:stretch>
             <a:fillRect/>
           </a:stretch>
@@ -3163,7 +3192,7 @@
           <p:nvPr/>
         </p:nvPicPr>
         <p:blipFill>
-          <a:blip r:embed="rId4"/>
+          <a:blip r:embed="rId5"/>
           <a:stretch>
             <a:fillRect/>
           </a:stretch>
@@ -3187,7 +3216,7 @@
           <p:nvPr/>
         </p:nvPicPr>
         <p:blipFill>
-          <a:blip r:embed="rId5"/>
+          <a:blip r:embed="rId6"/>
           <a:stretch>
             <a:fillRect/>
           </a:stretch>
@@ -3211,7 +3240,7 @@
           <p:nvPr/>
         </p:nvPicPr>
         <p:blipFill>
-          <a:blip r:embed="rId6"/>
+          <a:blip r:embed="rId7"/>
           <a:stretch>
             <a:fillRect/>
           </a:stretch>
@@ -4883,35 +4912,6 @@
           </p:txBody>
         </p:sp>
       </p:grpSp>
-      <p:pic>
-        <p:nvPicPr>
-          <p:cNvPr id="7" name="Picture 6" descr="diversifying_selection_corr.pdf"/>
-          <p:cNvPicPr>
-            <a:picLocks noChangeAspect="1"/>
-          </p:cNvPicPr>
-          <p:nvPr/>
-        </p:nvPicPr>
-        <p:blipFill rotWithShape="1">
-          <a:blip r:embed="rId7">
-            <a:extLst>
-              <a:ext uri="{28A0092B-C50C-407E-A947-70E740481C1C}">
-                <a14:useLocalDpi xmlns:a14="http://schemas.microsoft.com/office/drawing/2010/main" val="0"/>
-              </a:ext>
-            </a:extLst>
-          </a:blip>
-          <a:srcRect l="5369" t="12667" r="164" b="987"/>
-          <a:stretch/>
-        </p:blipFill>
-        <p:spPr>
-          <a:xfrm>
-            <a:off x="4013541" y="9144"/>
-            <a:ext cx="2131512" cy="1948288"/>
-          </a:xfrm>
-          <a:prstGeom prst="rect">
-            <a:avLst/>
-          </a:prstGeom>
-        </p:spPr>
-      </p:pic>
     </p:spTree>
     <p:extLst>
       <p:ext uri="{BB962C8B-B14F-4D97-AF65-F5344CB8AC3E}">

</xml_diff>

<commit_message>
Add response to minor comment 4
</commit_message>
<xml_diff>
--- a/paper/figures/omegabysite_structural_analysis/omegabysite_structural_analysis.pptx
+++ b/paper/figures/omegabysite_structural_analysis/omegabysite_structural_analysis.pptx
@@ -288,7 +288,7 @@
           <a:p>
             <a:fld id="{B1E60CEC-8CC6-8B48-9CD4-E19D93CC4CEE}" type="datetimeFigureOut">
               <a:rPr lang="en-US" smtClean="0"/>
-              <a:t>2/19/18</a:t>
+              <a:t>2/25/18</a:t>
             </a:fld>
             <a:endParaRPr lang="en-US"/>
           </a:p>
@@ -458,7 +458,7 @@
           <a:p>
             <a:fld id="{B1E60CEC-8CC6-8B48-9CD4-E19D93CC4CEE}" type="datetimeFigureOut">
               <a:rPr lang="en-US" smtClean="0"/>
-              <a:t>2/19/18</a:t>
+              <a:t>2/25/18</a:t>
             </a:fld>
             <a:endParaRPr lang="en-US"/>
           </a:p>
@@ -638,7 +638,7 @@
           <a:p>
             <a:fld id="{B1E60CEC-8CC6-8B48-9CD4-E19D93CC4CEE}" type="datetimeFigureOut">
               <a:rPr lang="en-US" smtClean="0"/>
-              <a:t>2/19/18</a:t>
+              <a:t>2/25/18</a:t>
             </a:fld>
             <a:endParaRPr lang="en-US"/>
           </a:p>
@@ -808,7 +808,7 @@
           <a:p>
             <a:fld id="{B1E60CEC-8CC6-8B48-9CD4-E19D93CC4CEE}" type="datetimeFigureOut">
               <a:rPr lang="en-US" smtClean="0"/>
-              <a:t>2/19/18</a:t>
+              <a:t>2/25/18</a:t>
             </a:fld>
             <a:endParaRPr lang="en-US"/>
           </a:p>
@@ -1054,7 +1054,7 @@
           <a:p>
             <a:fld id="{B1E60CEC-8CC6-8B48-9CD4-E19D93CC4CEE}" type="datetimeFigureOut">
               <a:rPr lang="en-US" smtClean="0"/>
-              <a:t>2/19/18</a:t>
+              <a:t>2/25/18</a:t>
             </a:fld>
             <a:endParaRPr lang="en-US"/>
           </a:p>
@@ -1342,7 +1342,7 @@
           <a:p>
             <a:fld id="{B1E60CEC-8CC6-8B48-9CD4-E19D93CC4CEE}" type="datetimeFigureOut">
               <a:rPr lang="en-US" smtClean="0"/>
-              <a:t>2/19/18</a:t>
+              <a:t>2/25/18</a:t>
             </a:fld>
             <a:endParaRPr lang="en-US"/>
           </a:p>
@@ -1769,7 +1769,7 @@
           <a:p>
             <a:fld id="{B1E60CEC-8CC6-8B48-9CD4-E19D93CC4CEE}" type="datetimeFigureOut">
               <a:rPr lang="en-US" smtClean="0"/>
-              <a:t>2/19/18</a:t>
+              <a:t>2/25/18</a:t>
             </a:fld>
             <a:endParaRPr lang="en-US"/>
           </a:p>
@@ -1887,7 +1887,7 @@
           <a:p>
             <a:fld id="{B1E60CEC-8CC6-8B48-9CD4-E19D93CC4CEE}" type="datetimeFigureOut">
               <a:rPr lang="en-US" smtClean="0"/>
-              <a:t>2/19/18</a:t>
+              <a:t>2/25/18</a:t>
             </a:fld>
             <a:endParaRPr lang="en-US"/>
           </a:p>
@@ -1982,7 +1982,7 @@
           <a:p>
             <a:fld id="{B1E60CEC-8CC6-8B48-9CD4-E19D93CC4CEE}" type="datetimeFigureOut">
               <a:rPr lang="en-US" smtClean="0"/>
-              <a:t>2/19/18</a:t>
+              <a:t>2/25/18</a:t>
             </a:fld>
             <a:endParaRPr lang="en-US"/>
           </a:p>
@@ -2259,7 +2259,7 @@
           <a:p>
             <a:fld id="{B1E60CEC-8CC6-8B48-9CD4-E19D93CC4CEE}" type="datetimeFigureOut">
               <a:rPr lang="en-US" smtClean="0"/>
-              <a:t>2/19/18</a:t>
+              <a:t>2/25/18</a:t>
             </a:fld>
             <a:endParaRPr lang="en-US"/>
           </a:p>
@@ -2512,7 +2512,7 @@
           <a:p>
             <a:fld id="{B1E60CEC-8CC6-8B48-9CD4-E19D93CC4CEE}" type="datetimeFigureOut">
               <a:rPr lang="en-US" smtClean="0"/>
-              <a:t>2/19/18</a:t>
+              <a:t>2/25/18</a:t>
             </a:fld>
             <a:endParaRPr lang="en-US"/>
           </a:p>
@@ -2725,7 +2725,7 @@
           <a:p>
             <a:fld id="{B1E60CEC-8CC6-8B48-9CD4-E19D93CC4CEE}" type="datetimeFigureOut">
               <a:rPr lang="en-US" smtClean="0"/>
-              <a:t>2/19/18</a:t>
+              <a:t>2/25/18</a:t>
             </a:fld>
             <a:endParaRPr lang="en-US"/>
           </a:p>
@@ -4818,7 +4818,7 @@
       </p:grpSp>
       <p:pic>
         <p:nvPicPr>
-          <p:cNvPr id="57" name="Picture 56"/>
+          <p:cNvPr id="70" name="Picture 69"/>
           <p:cNvPicPr>
             <a:picLocks noChangeAspect="1"/>
           </p:cNvPicPr>
@@ -4832,8 +4832,8 @@
         </p:blipFill>
         <p:spPr>
           <a:xfrm>
-            <a:off x="-600829" y="1909156"/>
-            <a:ext cx="3011871" cy="1948681"/>
+            <a:off x="-418320" y="11905"/>
+            <a:ext cx="2643657" cy="1964238"/>
           </a:xfrm>
           <a:prstGeom prst="rect">
             <a:avLst/>
@@ -4842,7 +4842,7 @@
       </p:pic>
       <p:pic>
         <p:nvPicPr>
-          <p:cNvPr id="64" name="Picture 63"/>
+          <p:cNvPr id="72" name="Picture 71"/>
           <p:cNvPicPr>
             <a:picLocks noChangeAspect="1"/>
           </p:cNvPicPr>
@@ -4856,8 +4856,8 @@
         </p:blipFill>
         <p:spPr>
           <a:xfrm>
-            <a:off x="1284906" y="1909156"/>
-            <a:ext cx="3011871" cy="1948681"/>
+            <a:off x="1473969" y="11967"/>
+            <a:ext cx="2646549" cy="1966385"/>
           </a:xfrm>
           <a:prstGeom prst="rect">
             <a:avLst/>
@@ -4866,7 +4866,7 @@
       </p:pic>
       <p:pic>
         <p:nvPicPr>
-          <p:cNvPr id="65" name="Picture 64"/>
+          <p:cNvPr id="73" name="Picture 72"/>
           <p:cNvPicPr>
             <a:picLocks noChangeAspect="1"/>
           </p:cNvPicPr>
@@ -4880,8 +4880,8 @@
         </p:blipFill>
         <p:spPr>
           <a:xfrm>
-            <a:off x="-593132" y="-37934"/>
-            <a:ext cx="3013784" cy="1949918"/>
+            <a:off x="-423430" y="1941041"/>
+            <a:ext cx="2648767" cy="1968034"/>
           </a:xfrm>
           <a:prstGeom prst="rect">
             <a:avLst/>
@@ -4890,7 +4890,7 @@
       </p:pic>
       <p:pic>
         <p:nvPicPr>
-          <p:cNvPr id="66" name="Picture 65"/>
+          <p:cNvPr id="74" name="Picture 73"/>
           <p:cNvPicPr>
             <a:picLocks noChangeAspect="1"/>
           </p:cNvPicPr>
@@ -4904,8 +4904,8 @@
         </p:blipFill>
         <p:spPr>
           <a:xfrm>
-            <a:off x="1282839" y="-37934"/>
-            <a:ext cx="3013784" cy="1949918"/>
+            <a:off x="1469574" y="1941040"/>
+            <a:ext cx="2648768" cy="1968035"/>
           </a:xfrm>
           <a:prstGeom prst="rect">
             <a:avLst/>

</xml_diff>